<commit_message>
cambios (presentacion) y calibrado de modelos
</commit_message>
<xml_diff>
--- a/docs/Presentación1.pptx
+++ b/docs/Presentación1.pptx
@@ -219,7 +219,7 @@
           <a:p>
             <a:fld id="{B3181DBF-9569-4DC7-9E9E-E96D9EB5847D}" type="datetimeFigureOut">
               <a:rPr lang="es-ES" smtClean="0"/>
-              <a:t>28/08/2024</a:t>
+              <a:t>30/08/2024</a:t>
             </a:fld>
             <a:endParaRPr lang="es-ES"/>
           </a:p>
@@ -969,7 +969,7 @@
           <a:p>
             <a:fld id="{BCF5FC0B-5855-4DB3-BB3E-E2DAA9A8FCB7}" type="datetimeFigureOut">
               <a:rPr lang="es-ES" smtClean="0"/>
-              <a:t>28/08/2024</a:t>
+              <a:t>30/08/2024</a:t>
             </a:fld>
             <a:endParaRPr lang="es-ES"/>
           </a:p>
@@ -1167,7 +1167,7 @@
           <a:p>
             <a:fld id="{BCF5FC0B-5855-4DB3-BB3E-E2DAA9A8FCB7}" type="datetimeFigureOut">
               <a:rPr lang="es-ES" smtClean="0"/>
-              <a:t>28/08/2024</a:t>
+              <a:t>30/08/2024</a:t>
             </a:fld>
             <a:endParaRPr lang="es-ES"/>
           </a:p>
@@ -1375,7 +1375,7 @@
           <a:p>
             <a:fld id="{BCF5FC0B-5855-4DB3-BB3E-E2DAA9A8FCB7}" type="datetimeFigureOut">
               <a:rPr lang="es-ES" smtClean="0"/>
-              <a:t>28/08/2024</a:t>
+              <a:t>30/08/2024</a:t>
             </a:fld>
             <a:endParaRPr lang="es-ES"/>
           </a:p>
@@ -1573,7 +1573,7 @@
           <a:p>
             <a:fld id="{BCF5FC0B-5855-4DB3-BB3E-E2DAA9A8FCB7}" type="datetimeFigureOut">
               <a:rPr lang="es-ES" smtClean="0"/>
-              <a:t>28/08/2024</a:t>
+              <a:t>30/08/2024</a:t>
             </a:fld>
             <a:endParaRPr lang="es-ES"/>
           </a:p>
@@ -1848,7 +1848,7 @@
           <a:p>
             <a:fld id="{BCF5FC0B-5855-4DB3-BB3E-E2DAA9A8FCB7}" type="datetimeFigureOut">
               <a:rPr lang="es-ES" smtClean="0"/>
-              <a:t>28/08/2024</a:t>
+              <a:t>30/08/2024</a:t>
             </a:fld>
             <a:endParaRPr lang="es-ES"/>
           </a:p>
@@ -2113,7 +2113,7 @@
           <a:p>
             <a:fld id="{BCF5FC0B-5855-4DB3-BB3E-E2DAA9A8FCB7}" type="datetimeFigureOut">
               <a:rPr lang="es-ES" smtClean="0"/>
-              <a:t>28/08/2024</a:t>
+              <a:t>30/08/2024</a:t>
             </a:fld>
             <a:endParaRPr lang="es-ES"/>
           </a:p>
@@ -2525,7 +2525,7 @@
           <a:p>
             <a:fld id="{BCF5FC0B-5855-4DB3-BB3E-E2DAA9A8FCB7}" type="datetimeFigureOut">
               <a:rPr lang="es-ES" smtClean="0"/>
-              <a:t>28/08/2024</a:t>
+              <a:t>30/08/2024</a:t>
             </a:fld>
             <a:endParaRPr lang="es-ES"/>
           </a:p>
@@ -2666,7 +2666,7 @@
           <a:p>
             <a:fld id="{BCF5FC0B-5855-4DB3-BB3E-E2DAA9A8FCB7}" type="datetimeFigureOut">
               <a:rPr lang="es-ES" smtClean="0"/>
-              <a:t>28/08/2024</a:t>
+              <a:t>30/08/2024</a:t>
             </a:fld>
             <a:endParaRPr lang="es-ES"/>
           </a:p>
@@ -2779,7 +2779,7 @@
           <a:p>
             <a:fld id="{BCF5FC0B-5855-4DB3-BB3E-E2DAA9A8FCB7}" type="datetimeFigureOut">
               <a:rPr lang="es-ES" smtClean="0"/>
-              <a:t>28/08/2024</a:t>
+              <a:t>30/08/2024</a:t>
             </a:fld>
             <a:endParaRPr lang="es-ES"/>
           </a:p>
@@ -3090,7 +3090,7 @@
           <a:p>
             <a:fld id="{BCF5FC0B-5855-4DB3-BB3E-E2DAA9A8FCB7}" type="datetimeFigureOut">
               <a:rPr lang="es-ES" smtClean="0"/>
-              <a:t>28/08/2024</a:t>
+              <a:t>30/08/2024</a:t>
             </a:fld>
             <a:endParaRPr lang="es-ES"/>
           </a:p>
@@ -3378,7 +3378,7 @@
           <a:p>
             <a:fld id="{BCF5FC0B-5855-4DB3-BB3E-E2DAA9A8FCB7}" type="datetimeFigureOut">
               <a:rPr lang="es-ES" smtClean="0"/>
-              <a:t>28/08/2024</a:t>
+              <a:t>30/08/2024</a:t>
             </a:fld>
             <a:endParaRPr lang="es-ES"/>
           </a:p>
@@ -3619,7 +3619,7 @@
           <a:p>
             <a:fld id="{BCF5FC0B-5855-4DB3-BB3E-E2DAA9A8FCB7}" type="datetimeFigureOut">
               <a:rPr lang="es-ES" smtClean="0"/>
-              <a:t>28/08/2024</a:t>
+              <a:t>30/08/2024</a:t>
             </a:fld>
             <a:endParaRPr lang="es-ES"/>
           </a:p>
@@ -4365,7 +4365,7 @@
         <p:spPr>
           <a:xfrm>
             <a:off x="130671" y="26619"/>
-            <a:ext cx="2255715" cy="708721"/>
+            <a:ext cx="3013666" cy="946861"/>
           </a:xfrm>
           <a:prstGeom prst="rect">
             <a:avLst/>
@@ -14266,8 +14266,8 @@
         </p:nvSpPr>
         <p:spPr>
           <a:xfrm>
-            <a:off x="1276433" y="2882377"/>
-            <a:ext cx="4514767" cy="3139321"/>
+            <a:off x="1188301" y="2875328"/>
+            <a:ext cx="4514767" cy="3693319"/>
           </a:xfrm>
           <a:prstGeom prst="rect">
             <a:avLst/>
@@ -14282,7 +14282,7 @@
           <a:p>
             <a:r>
               <a:rPr lang="es-ES" dirty="0"/>
-              <a:t>Contexto: Departamentos de RR.HH. de empresas que requieran empleados con profesiones que requieran un examen habilitante y apuntarse a Colegios Profesionales (arquitectos, abogados, algunos ingenieros, médicos, etc.)</a:t>
+              <a:t>Contexto: Departamentos de RR.HH. de empresas que requieran empleados con profesiones que requieran un examen habilitante y apuntarse a Colegios Profesionales (arquitectos, abogados, algunos ingenieros, médicos, etc.). O de cualquier otro tipo de profesional que comparta notas académicas.</a:t>
             </a:r>
           </a:p>
           <a:p>
@@ -14291,7 +14291,7 @@
           <a:p>
             <a:r>
               <a:rPr lang="es-ES" dirty="0"/>
-              <a:t>Aplicable también a profesionales del ámbito público que estén dispuestos a compartir sus notas en oposiciones (profesores, por ejemplo).</a:t>
+              <a:t>Aplicable también a profesionales del ámbito público que estén dispuestos a compartir sus notas de oposiciones (profesores, por ejemplo).</a:t>
             </a:r>
           </a:p>
         </p:txBody>
@@ -15731,7 +15731,33 @@
                 <a:ea typeface="+mn-ea"/>
                 <a:cs typeface="+mn-cs"/>
               </a:rPr>
-              <a:t>nominales</a:t>
+              <a:t>n</a:t>
+            </a:r>
+            <a:r>
+              <a:rPr lang="es-ES" dirty="0">
+                <a:solidFill>
+                  <a:prstClr val="black"/>
+                </a:solidFill>
+                <a:latin typeface="Aptos" panose="02110004020202020204"/>
+              </a:rPr>
+              <a:t>u</a:t>
+            </a:r>
+            <a:r>
+              <a:rPr kumimoji="0" lang="es-ES" sz="1800" b="0" i="0" u="none" strike="noStrike" kern="1200" cap="none" spc="0" normalizeH="0" baseline="0" noProof="0" dirty="0" err="1">
+                <a:ln>
+                  <a:noFill/>
+                </a:ln>
+                <a:solidFill>
+                  <a:prstClr val="black"/>
+                </a:solidFill>
+                <a:effectLst/>
+                <a:uLnTx/>
+                <a:uFillTx/>
+                <a:latin typeface="Aptos" panose="02110004020202020204"/>
+                <a:ea typeface="+mn-ea"/>
+                <a:cs typeface="+mn-cs"/>
+              </a:rPr>
+              <a:t>méricos</a:t>
             </a:r>
             <a:r>
               <a:rPr kumimoji="0" lang="en-US" sz="1800" b="0" i="0" u="none" strike="noStrike" kern="1200" cap="none" spc="0" normalizeH="0" baseline="0" noProof="0" dirty="0">
@@ -15748,8 +15774,39 @@
                 <a:ea typeface="+mn-ea"/>
                 <a:cs typeface="+mn-cs"/>
               </a:rPr>
-              <a:t> [1/0]</a:t>
-            </a:r>
+              <a:t> </a:t>
+            </a:r>
+            <a:r>
+              <a:rPr kumimoji="0" lang="en-US" sz="1800" b="0" i="0" u="none" strike="noStrike" kern="1200" cap="none" spc="0" normalizeH="0" baseline="0" noProof="0" dirty="0" err="1">
+                <a:ln>
+                  <a:noFill/>
+                </a:ln>
+                <a:solidFill>
+                  <a:prstClr val="black"/>
+                </a:solidFill>
+                <a:effectLst/>
+                <a:uLnTx/>
+                <a:uFillTx/>
+                <a:latin typeface="Aptos" panose="02110004020202020204"/>
+                <a:ea typeface="+mn-ea"/>
+                <a:cs typeface="+mn-cs"/>
+              </a:rPr>
+              <a:t>binarios</a:t>
+            </a:r>
+            <a:endParaRPr kumimoji="0" lang="en-US" sz="1800" b="0" i="0" u="none" strike="noStrike" kern="1200" cap="none" spc="0" normalizeH="0" baseline="0" noProof="0" dirty="0">
+              <a:ln>
+                <a:noFill/>
+              </a:ln>
+              <a:solidFill>
+                <a:prstClr val="black"/>
+              </a:solidFill>
+              <a:effectLst/>
+              <a:uLnTx/>
+              <a:uFillTx/>
+              <a:latin typeface="Aptos" panose="02110004020202020204"/>
+              <a:ea typeface="+mn-ea"/>
+              <a:cs typeface="+mn-cs"/>
+            </a:endParaRPr>
           </a:p>
           <a:p>
             <a:pPr marL="0" marR="0" lvl="0" indent="0" algn="l" defTabSz="914400" rtl="0" eaLnBrk="1" fontAlgn="auto" latinLnBrk="0" hangingPunct="1">
@@ -15801,7 +15858,7 @@
                 <a:ea typeface="+mn-ea"/>
                 <a:cs typeface="+mn-cs"/>
               </a:rPr>
-              <a:t>: Datos nominales, continuos, discretos y ordinales.</a:t>
+              <a:t>: Datos numéricos, continuos, discretos y ordinales.</a:t>
             </a:r>
           </a:p>
           <a:p>

</xml_diff>